<commit_message>
2 new pitfalls post
</commit_message>
<xml_diff>
--- a/img/mistake/XX_building_logos.pptx
+++ b/img/mistake/XX_building_logos.pptx
@@ -5,7 +5,7 @@
     <p:sldMasterId id="2147483660" r:id="rId1"/>
   </p:sldMasterIdLst>
   <p:notesMasterIdLst>
-    <p:notesMasterId r:id="rId39"/>
+    <p:notesMasterId r:id="rId40"/>
   </p:notesMasterIdLst>
   <p:sldIdLst>
     <p:sldId id="256" r:id="rId2"/>
@@ -45,6 +45,7 @@
     <p:sldId id="298" r:id="rId36"/>
     <p:sldId id="300" r:id="rId37"/>
     <p:sldId id="302" r:id="rId38"/>
+    <p:sldId id="303" r:id="rId39"/>
   </p:sldIdLst>
   <p:sldSz cx="3600450" cy="3600450"/>
   <p:notesSz cx="6858000" cy="9144000"/>
@@ -233,7 +234,7 @@
           <a:p>
             <a:fld id="{A29C25AE-20FD-CA4A-8C80-D7AD6B352ECC}" type="datetimeFigureOut">
               <a:rPr lang="en-US" smtClean="0"/>
-              <a:t>7/5/18</a:t>
+              <a:t>7/6/18</a:t>
             </a:fld>
             <a:endParaRPr lang="en-US"/>
           </a:p>
@@ -2725,6 +2726,141 @@
 </p:notes>
 </file>
 
+<file path=ppt/notesSlides/notesSlide27.xml><?xml version="1.0" encoding="utf-8"?>
+<p:notes xmlns:a="http://schemas.openxmlformats.org/drawingml/2006/main" xmlns:r="http://schemas.openxmlformats.org/officeDocument/2006/relationships" xmlns:p="http://schemas.openxmlformats.org/presentationml/2006/main">
+  <p:cSld>
+    <p:spTree>
+      <p:nvGrpSpPr>
+        <p:cNvPr id="1" name=""/>
+        <p:cNvGrpSpPr/>
+        <p:nvPr/>
+      </p:nvGrpSpPr>
+      <p:grpSpPr>
+        <a:xfrm>
+          <a:off x="0" y="0"/>
+          <a:ext cx="0" cy="0"/>
+          <a:chOff x="0" y="0"/>
+          <a:chExt cx="0" cy="0"/>
+        </a:xfrm>
+      </p:grpSpPr>
+      <p:sp>
+        <p:nvSpPr>
+          <p:cNvPr id="2" name="Slide Image Placeholder 1"/>
+          <p:cNvSpPr>
+            <a:spLocks noGrp="1" noRot="1" noChangeAspect="1"/>
+          </p:cNvSpPr>
+          <p:nvPr>
+            <p:ph type="sldImg"/>
+          </p:nvPr>
+        </p:nvSpPr>
+        <p:spPr/>
+      </p:sp>
+      <p:sp>
+        <p:nvSpPr>
+          <p:cNvPr id="3" name="Notes Placeholder 2"/>
+          <p:cNvSpPr>
+            <a:spLocks noGrp="1"/>
+          </p:cNvSpPr>
+          <p:nvPr>
+            <p:ph type="body" idx="1"/>
+          </p:nvPr>
+        </p:nvSpPr>
+        <p:spPr/>
+        <p:txBody>
+          <a:bodyPr/>
+          <a:lstStyle/>
+          <a:p>
+            <a:pPr marL="0" marR="0" indent="0" algn="l" defTabSz="345560" rtl="0" eaLnBrk="1" fontAlgn="auto" latinLnBrk="0" hangingPunct="1">
+              <a:lnSpc>
+                <a:spcPct val="100000"/>
+              </a:lnSpc>
+              <a:spcBef>
+                <a:spcPts val="0"/>
+              </a:spcBef>
+              <a:spcAft>
+                <a:spcPts val="0"/>
+              </a:spcAft>
+              <a:buClrTx/>
+              <a:buSzTx/>
+              <a:buFontTx/>
+              <a:buNone/>
+              <a:tabLst/>
+              <a:defRPr/>
+            </a:pPr>
+            <a:r>
+              <a:rPr lang="en-US" sz="454" b="1" i="0" u="none" strike="noStrike" kern="1200" dirty="0" smtClean="0">
+                <a:solidFill>
+                  <a:schemeClr val="tx1"/>
+                </a:solidFill>
+                <a:effectLst/>
+                <a:latin typeface="+mn-lt"/>
+                <a:ea typeface="+mn-ea"/>
+                <a:cs typeface="+mn-cs"/>
+              </a:rPr>
+              <a:t>Improper intervals or units</a:t>
+            </a:r>
+          </a:p>
+          <a:p>
+            <a:r>
+              <a:rPr lang="en-US" dirty="0" err="1" smtClean="0"/>
+              <a:t>En</a:t>
+            </a:r>
+            <a:r>
+              <a:rPr lang="en-US" dirty="0" smtClean="0"/>
+              <a:t> </a:t>
+            </a:r>
+            <a:r>
+              <a:rPr lang="en-US" dirty="0" err="1" smtClean="0"/>
+              <a:t>gros</a:t>
+            </a:r>
+            <a:r>
+              <a:rPr lang="en-US" smtClean="0"/>
+              <a:t> X axis fait 2001, 2002, 2010,</a:t>
+            </a:r>
+            <a:r>
+              <a:rPr lang="en-US" baseline="0" smtClean="0"/>
+              <a:t> 2011</a:t>
+            </a:r>
+            <a:endParaRPr lang="en-US"/>
+          </a:p>
+        </p:txBody>
+      </p:sp>
+      <p:sp>
+        <p:nvSpPr>
+          <p:cNvPr id="4" name="Slide Number Placeholder 3"/>
+          <p:cNvSpPr>
+            <a:spLocks noGrp="1"/>
+          </p:cNvSpPr>
+          <p:nvPr>
+            <p:ph type="sldNum" sz="quarter" idx="10"/>
+          </p:nvPr>
+        </p:nvSpPr>
+        <p:spPr/>
+        <p:txBody>
+          <a:bodyPr/>
+          <a:lstStyle/>
+          <a:p>
+            <a:fld id="{7831F866-C993-A644-BA4C-5AD247E41B58}" type="slidenum">
+              <a:rPr lang="en-US" smtClean="0"/>
+              <a:t>38</a:t>
+            </a:fld>
+            <a:endParaRPr lang="en-US"/>
+          </a:p>
+        </p:txBody>
+      </p:sp>
+    </p:spTree>
+    <p:extLst>
+      <p:ext uri="{BB962C8B-B14F-4D97-AF65-F5344CB8AC3E}">
+        <p14:creationId xmlns:p14="http://schemas.microsoft.com/office/powerpoint/2010/main" val="1665347193"/>
+      </p:ext>
+    </p:extLst>
+  </p:cSld>
+  <p:clrMapOvr>
+    <a:masterClrMapping/>
+  </p:clrMapOvr>
+</p:notes>
+</file>
+
 <file path=ppt/notesSlides/notesSlide3.xml><?xml version="1.0" encoding="utf-8"?>
 <p:notes xmlns:a="http://schemas.openxmlformats.org/drawingml/2006/main" xmlns:r="http://schemas.openxmlformats.org/officeDocument/2006/relationships" xmlns:p="http://schemas.openxmlformats.org/presentationml/2006/main">
   <p:cSld>
@@ -3843,7 +3979,7 @@
           <a:p>
             <a:fld id="{59DFCC1F-3322-FD40-8733-43910790F7FA}" type="datetimeFigureOut">
               <a:rPr lang="en-US" smtClean="0"/>
-              <a:t>7/5/18</a:t>
+              <a:t>7/6/18</a:t>
             </a:fld>
             <a:endParaRPr lang="en-US"/>
           </a:p>
@@ -4008,7 +4144,7 @@
           <a:p>
             <a:fld id="{59DFCC1F-3322-FD40-8733-43910790F7FA}" type="datetimeFigureOut">
               <a:rPr lang="en-US" smtClean="0"/>
-              <a:t>7/5/18</a:t>
+              <a:t>7/6/18</a:t>
             </a:fld>
             <a:endParaRPr lang="en-US"/>
           </a:p>
@@ -4183,7 +4319,7 @@
           <a:p>
             <a:fld id="{59DFCC1F-3322-FD40-8733-43910790F7FA}" type="datetimeFigureOut">
               <a:rPr lang="en-US" smtClean="0"/>
-              <a:t>7/5/18</a:t>
+              <a:t>7/6/18</a:t>
             </a:fld>
             <a:endParaRPr lang="en-US"/>
           </a:p>
@@ -4348,7 +4484,7 @@
           <a:p>
             <a:fld id="{59DFCC1F-3322-FD40-8733-43910790F7FA}" type="datetimeFigureOut">
               <a:rPr lang="en-US" smtClean="0"/>
-              <a:t>7/5/18</a:t>
+              <a:t>7/6/18</a:t>
             </a:fld>
             <a:endParaRPr lang="en-US"/>
           </a:p>
@@ -4587,7 +4723,7 @@
           <a:p>
             <a:fld id="{59DFCC1F-3322-FD40-8733-43910790F7FA}" type="datetimeFigureOut">
               <a:rPr lang="en-US" smtClean="0"/>
-              <a:t>7/5/18</a:t>
+              <a:t>7/6/18</a:t>
             </a:fld>
             <a:endParaRPr lang="en-US"/>
           </a:p>
@@ -4814,7 +4950,7 @@
           <a:p>
             <a:fld id="{59DFCC1F-3322-FD40-8733-43910790F7FA}" type="datetimeFigureOut">
               <a:rPr lang="en-US" smtClean="0"/>
-              <a:t>7/5/18</a:t>
+              <a:t>7/6/18</a:t>
             </a:fld>
             <a:endParaRPr lang="en-US"/>
           </a:p>
@@ -5176,7 +5312,7 @@
           <a:p>
             <a:fld id="{59DFCC1F-3322-FD40-8733-43910790F7FA}" type="datetimeFigureOut">
               <a:rPr lang="en-US" smtClean="0"/>
-              <a:t>7/5/18</a:t>
+              <a:t>7/6/18</a:t>
             </a:fld>
             <a:endParaRPr lang="en-US"/>
           </a:p>
@@ -5289,7 +5425,7 @@
           <a:p>
             <a:fld id="{59DFCC1F-3322-FD40-8733-43910790F7FA}" type="datetimeFigureOut">
               <a:rPr lang="en-US" smtClean="0"/>
-              <a:t>7/5/18</a:t>
+              <a:t>7/6/18</a:t>
             </a:fld>
             <a:endParaRPr lang="en-US"/>
           </a:p>
@@ -5379,7 +5515,7 @@
           <a:p>
             <a:fld id="{59DFCC1F-3322-FD40-8733-43910790F7FA}" type="datetimeFigureOut">
               <a:rPr lang="en-US" smtClean="0"/>
-              <a:t>7/5/18</a:t>
+              <a:t>7/6/18</a:t>
             </a:fld>
             <a:endParaRPr lang="en-US"/>
           </a:p>
@@ -5651,7 +5787,7 @@
           <a:p>
             <a:fld id="{59DFCC1F-3322-FD40-8733-43910790F7FA}" type="datetimeFigureOut">
               <a:rPr lang="en-US" smtClean="0"/>
-              <a:t>7/5/18</a:t>
+              <a:t>7/6/18</a:t>
             </a:fld>
             <a:endParaRPr lang="en-US"/>
           </a:p>
@@ -5903,7 +6039,7 @@
           <a:p>
             <a:fld id="{59DFCC1F-3322-FD40-8733-43910790F7FA}" type="datetimeFigureOut">
               <a:rPr lang="en-US" smtClean="0"/>
-              <a:t>7/5/18</a:t>
+              <a:t>7/6/18</a:t>
             </a:fld>
             <a:endParaRPr lang="en-US"/>
           </a:p>
@@ -6111,7 +6247,7 @@
           <a:p>
             <a:fld id="{59DFCC1F-3322-FD40-8733-43910790F7FA}" type="datetimeFigureOut">
               <a:rPr lang="en-US" smtClean="0"/>
-              <a:t>7/5/18</a:t>
+              <a:t>7/6/18</a:t>
             </a:fld>
             <a:endParaRPr lang="en-US"/>
           </a:p>
@@ -22361,6 +22497,74 @@
     <p:extLst>
       <p:ext uri="{BB962C8B-B14F-4D97-AF65-F5344CB8AC3E}">
         <p14:creationId xmlns:p14="http://schemas.microsoft.com/office/powerpoint/2010/main" val="673166323"/>
+      </p:ext>
+    </p:extLst>
+  </p:cSld>
+  <p:clrMapOvr>
+    <a:masterClrMapping/>
+  </p:clrMapOvr>
+</p:sld>
+</file>
+
+<file path=ppt/slides/slide38.xml><?xml version="1.0" encoding="utf-8"?>
+<p:sld xmlns:a="http://schemas.openxmlformats.org/drawingml/2006/main" xmlns:r="http://schemas.openxmlformats.org/officeDocument/2006/relationships" xmlns:p="http://schemas.openxmlformats.org/presentationml/2006/main">
+  <p:cSld>
+    <p:spTree>
+      <p:nvGrpSpPr>
+        <p:cNvPr id="1" name=""/>
+        <p:cNvGrpSpPr/>
+        <p:nvPr/>
+      </p:nvGrpSpPr>
+      <p:grpSpPr>
+        <a:xfrm>
+          <a:off x="0" y="0"/>
+          <a:ext cx="0" cy="0"/>
+          <a:chOff x="0" y="0"/>
+          <a:chExt cx="0" cy="0"/>
+        </a:xfrm>
+      </p:grpSpPr>
+      <p:sp>
+        <p:nvSpPr>
+          <p:cNvPr id="2" name="Title 1"/>
+          <p:cNvSpPr>
+            <a:spLocks noGrp="1"/>
+          </p:cNvSpPr>
+          <p:nvPr>
+            <p:ph type="title"/>
+          </p:nvPr>
+        </p:nvSpPr>
+        <p:spPr/>
+        <p:txBody>
+          <a:bodyPr/>
+          <a:lstStyle/>
+          <a:p>
+            <a:endParaRPr lang="en-US"/>
+          </a:p>
+        </p:txBody>
+      </p:sp>
+      <p:sp>
+        <p:nvSpPr>
+          <p:cNvPr id="3" name="Content Placeholder 2"/>
+          <p:cNvSpPr>
+            <a:spLocks noGrp="1"/>
+          </p:cNvSpPr>
+          <p:nvPr>
+            <p:ph idx="1"/>
+          </p:nvPr>
+        </p:nvSpPr>
+        <p:spPr/>
+        <p:txBody>
+          <a:bodyPr/>
+          <a:lstStyle/>
+          <a:p>
+            <a:endParaRPr lang="en-US"/>
+          </a:p>
+        </p:txBody>
+      </p:sp>
+    </p:spTree>
+    <p:extLst>
+      <p:ext uri="{BB962C8B-B14F-4D97-AF65-F5344CB8AC3E}">
+        <p14:creationId xmlns:p14="http://schemas.microsoft.com/office/powerpoint/2010/main" val="1087832072"/>
       </p:ext>
     </p:extLst>
   </p:cSld>

</xml_diff>